<commit_message>
update document about TopTrader
</commit_message>
<xml_diff>
--- a/doc/TopTrader.pptx
+++ b/doc/TopTrader.pptx
@@ -7,6 +7,7 @@
   <p:sldIdLst>
     <p:sldId id="256" r:id="rId2"/>
     <p:sldId id="258" r:id="rId3"/>
+    <p:sldId id="259" r:id="rId4"/>
   </p:sldIdLst>
   <p:sldSz cx="12192000" cy="6858000"/>
   <p:notesSz cx="6858000" cy="9144000"/>
@@ -244,7 +245,7 @@
           <a:p>
             <a:fld id="{6CA172D4-DF79-4B9B-8BC5-98EF4E94601A}" type="datetimeFigureOut">
               <a:rPr lang="ko-KR" altLang="en-US" smtClean="0"/>
-              <a:t>2018-06-06</a:t>
+              <a:t>2018-06-12</a:t>
             </a:fld>
             <a:endParaRPr lang="ko-KR" altLang="en-US"/>
           </a:p>
@@ -414,7 +415,7 @@
           <a:p>
             <a:fld id="{6CA172D4-DF79-4B9B-8BC5-98EF4E94601A}" type="datetimeFigureOut">
               <a:rPr lang="ko-KR" altLang="en-US" smtClean="0"/>
-              <a:t>2018-06-06</a:t>
+              <a:t>2018-06-12</a:t>
             </a:fld>
             <a:endParaRPr lang="ko-KR" altLang="en-US"/>
           </a:p>
@@ -594,7 +595,7 @@
           <a:p>
             <a:fld id="{6CA172D4-DF79-4B9B-8BC5-98EF4E94601A}" type="datetimeFigureOut">
               <a:rPr lang="ko-KR" altLang="en-US" smtClean="0"/>
-              <a:t>2018-06-06</a:t>
+              <a:t>2018-06-12</a:t>
             </a:fld>
             <a:endParaRPr lang="ko-KR" altLang="en-US"/>
           </a:p>
@@ -764,7 +765,7 @@
           <a:p>
             <a:fld id="{6CA172D4-DF79-4B9B-8BC5-98EF4E94601A}" type="datetimeFigureOut">
               <a:rPr lang="ko-KR" altLang="en-US" smtClean="0"/>
-              <a:t>2018-06-06</a:t>
+              <a:t>2018-06-12</a:t>
             </a:fld>
             <a:endParaRPr lang="ko-KR" altLang="en-US"/>
           </a:p>
@@ -1010,7 +1011,7 @@
           <a:p>
             <a:fld id="{6CA172D4-DF79-4B9B-8BC5-98EF4E94601A}" type="datetimeFigureOut">
               <a:rPr lang="ko-KR" altLang="en-US" smtClean="0"/>
-              <a:t>2018-06-06</a:t>
+              <a:t>2018-06-12</a:t>
             </a:fld>
             <a:endParaRPr lang="ko-KR" altLang="en-US"/>
           </a:p>
@@ -1242,7 +1243,7 @@
           <a:p>
             <a:fld id="{6CA172D4-DF79-4B9B-8BC5-98EF4E94601A}" type="datetimeFigureOut">
               <a:rPr lang="ko-KR" altLang="en-US" smtClean="0"/>
-              <a:t>2018-06-06</a:t>
+              <a:t>2018-06-12</a:t>
             </a:fld>
             <a:endParaRPr lang="ko-KR" altLang="en-US"/>
           </a:p>
@@ -1609,7 +1610,7 @@
           <a:p>
             <a:fld id="{6CA172D4-DF79-4B9B-8BC5-98EF4E94601A}" type="datetimeFigureOut">
               <a:rPr lang="ko-KR" altLang="en-US" smtClean="0"/>
-              <a:t>2018-06-06</a:t>
+              <a:t>2018-06-12</a:t>
             </a:fld>
             <a:endParaRPr lang="ko-KR" altLang="en-US"/>
           </a:p>
@@ -1727,7 +1728,7 @@
           <a:p>
             <a:fld id="{6CA172D4-DF79-4B9B-8BC5-98EF4E94601A}" type="datetimeFigureOut">
               <a:rPr lang="ko-KR" altLang="en-US" smtClean="0"/>
-              <a:t>2018-06-06</a:t>
+              <a:t>2018-06-12</a:t>
             </a:fld>
             <a:endParaRPr lang="ko-KR" altLang="en-US"/>
           </a:p>
@@ -1822,7 +1823,7 @@
           <a:p>
             <a:fld id="{6CA172D4-DF79-4B9B-8BC5-98EF4E94601A}" type="datetimeFigureOut">
               <a:rPr lang="ko-KR" altLang="en-US" smtClean="0"/>
-              <a:t>2018-06-06</a:t>
+              <a:t>2018-06-12</a:t>
             </a:fld>
             <a:endParaRPr lang="ko-KR" altLang="en-US"/>
           </a:p>
@@ -2099,7 +2100,7 @@
           <a:p>
             <a:fld id="{6CA172D4-DF79-4B9B-8BC5-98EF4E94601A}" type="datetimeFigureOut">
               <a:rPr lang="ko-KR" altLang="en-US" smtClean="0"/>
-              <a:t>2018-06-06</a:t>
+              <a:t>2018-06-12</a:t>
             </a:fld>
             <a:endParaRPr lang="ko-KR" altLang="en-US"/>
           </a:p>
@@ -2352,7 +2353,7 @@
           <a:p>
             <a:fld id="{6CA172D4-DF79-4B9B-8BC5-98EF4E94601A}" type="datetimeFigureOut">
               <a:rPr lang="ko-KR" altLang="en-US" smtClean="0"/>
-              <a:t>2018-06-06</a:t>
+              <a:t>2018-06-12</a:t>
             </a:fld>
             <a:endParaRPr lang="ko-KR" altLang="en-US"/>
           </a:p>
@@ -2565,7 +2566,7 @@
           <a:p>
             <a:fld id="{6CA172D4-DF79-4B9B-8BC5-98EF4E94601A}" type="datetimeFigureOut">
               <a:rPr lang="ko-KR" altLang="en-US" smtClean="0"/>
-              <a:t>2018-06-06</a:t>
+              <a:t>2018-06-12</a:t>
             </a:fld>
             <a:endParaRPr lang="ko-KR" altLang="en-US"/>
           </a:p>
@@ -6287,7 +6288,6 @@
               <a:rPr lang="ko-KR" altLang="en-US" dirty="0"/>
               <a:t>종목별 분봉 데이터 수집</a:t>
             </a:r>
-            <a:endParaRPr lang="ko-KR" altLang="en-US" dirty="0"/>
           </a:p>
         </p:txBody>
       </p:sp>
@@ -6331,7 +6331,6 @@
               <a:rPr lang="ko-KR" altLang="en-US" dirty="0"/>
               <a:t>매수 신호 분석</a:t>
             </a:r>
-            <a:endParaRPr lang="ko-KR" altLang="en-US" dirty="0"/>
           </a:p>
         </p:txBody>
       </p:sp>
@@ -7413,6 +7412,1740 @@
     <p:extLst>
       <p:ext uri="{BB962C8B-B14F-4D97-AF65-F5344CB8AC3E}">
         <p14:creationId xmlns:p14="http://schemas.microsoft.com/office/powerpoint/2010/main" val="435604694"/>
+      </p:ext>
+    </p:extLst>
+  </p:cSld>
+  <p:clrMapOvr>
+    <a:masterClrMapping/>
+  </p:clrMapOvr>
+  <p:timing>
+    <p:tnLst>
+      <p:par>
+        <p:cTn id="1" dur="indefinite" restart="never" nodeType="tmRoot"/>
+      </p:par>
+    </p:tnLst>
+  </p:timing>
+</p:sld>
+</file>
+
+<file path=ppt/slides/slide3.xml><?xml version="1.0" encoding="utf-8"?>
+<p:sld xmlns:a="http://schemas.openxmlformats.org/drawingml/2006/main" xmlns:r="http://schemas.openxmlformats.org/officeDocument/2006/relationships" xmlns:p="http://schemas.openxmlformats.org/presentationml/2006/main">
+  <p:cSld>
+    <p:spTree>
+      <p:nvGrpSpPr>
+        <p:cNvPr id="1" name=""/>
+        <p:cNvGrpSpPr/>
+        <p:nvPr/>
+      </p:nvGrpSpPr>
+      <p:grpSpPr>
+        <a:xfrm>
+          <a:off x="0" y="0"/>
+          <a:ext cx="0" cy="0"/>
+          <a:chOff x="0" y="0"/>
+          <a:chExt cx="0" cy="0"/>
+        </a:xfrm>
+      </p:grpSpPr>
+      <p:sp>
+        <p:nvSpPr>
+          <p:cNvPr id="4" name="TextBox 3"/>
+          <p:cNvSpPr txBox="1"/>
+          <p:nvPr/>
+        </p:nvSpPr>
+        <p:spPr>
+          <a:xfrm>
+            <a:off x="93305" y="102636"/>
+            <a:ext cx="2751972" cy="369332"/>
+          </a:xfrm>
+          <a:prstGeom prst="rect">
+            <a:avLst/>
+          </a:prstGeom>
+          <a:noFill/>
+        </p:spPr>
+        <p:txBody>
+          <a:bodyPr wrap="none" rtlCol="0">
+            <a:spAutoFit/>
+          </a:bodyPr>
+          <a:lstStyle/>
+          <a:p>
+            <a:r>
+              <a:rPr lang="en-US" altLang="ko-KR" dirty="0" smtClean="0">
+                <a:latin typeface="나눔바른고딕" panose="020B0603020101020101" pitchFamily="50" charset="-127"/>
+                <a:ea typeface="나눔바른고딕" panose="020B0603020101020101" pitchFamily="50" charset="-127"/>
+              </a:rPr>
+              <a:t>Understanding Transition</a:t>
+            </a:r>
+            <a:endParaRPr lang="ko-KR" altLang="en-US" dirty="0">
+              <a:latin typeface="나눔바른고딕" panose="020B0603020101020101" pitchFamily="50" charset="-127"/>
+              <a:ea typeface="나눔바른고딕" panose="020B0603020101020101" pitchFamily="50" charset="-127"/>
+            </a:endParaRPr>
+          </a:p>
+        </p:txBody>
+      </p:sp>
+      <p:pic>
+        <p:nvPicPr>
+          <p:cNvPr id="1026" name="Picture 2" descr="programmer iconì ëí ì´ë¯¸ì§ ê²ìê²°ê³¼"/>
+          <p:cNvPicPr>
+            <a:picLocks noChangeAspect="1" noChangeArrowheads="1"/>
+          </p:cNvPicPr>
+          <p:nvPr/>
+        </p:nvPicPr>
+        <p:blipFill>
+          <a:blip r:embed="rId2" cstate="print">
+            <a:extLst>
+              <a:ext uri="{28A0092B-C50C-407E-A947-70E740481C1C}">
+                <a14:useLocalDpi xmlns:a14="http://schemas.microsoft.com/office/drawing/2010/main" val="0"/>
+              </a:ext>
+            </a:extLst>
+          </a:blip>
+          <a:srcRect/>
+          <a:stretch>
+            <a:fillRect/>
+          </a:stretch>
+        </p:blipFill>
+        <p:spPr bwMode="auto">
+          <a:xfrm>
+            <a:off x="765175" y="579009"/>
+            <a:ext cx="530225" cy="530225"/>
+          </a:xfrm>
+          <a:prstGeom prst="rect">
+            <a:avLst/>
+          </a:prstGeom>
+          <a:noFill/>
+          <a:extLst>
+            <a:ext uri="{909E8E84-426E-40DD-AFC4-6F175D3DCCD1}">
+              <a14:hiddenFill xmlns:a14="http://schemas.microsoft.com/office/drawing/2010/main">
+                <a:solidFill>
+                  <a:srgbClr val="FFFFFF"/>
+                </a:solidFill>
+              </a14:hiddenFill>
+            </a:ext>
+          </a:extLst>
+        </p:spPr>
+      </p:pic>
+      <p:sp>
+        <p:nvSpPr>
+          <p:cNvPr id="54" name="TextBox 53"/>
+          <p:cNvSpPr txBox="1"/>
+          <p:nvPr/>
+        </p:nvSpPr>
+        <p:spPr>
+          <a:xfrm>
+            <a:off x="8790491" y="2606313"/>
+            <a:ext cx="1288173" cy="276999"/>
+          </a:xfrm>
+          <a:prstGeom prst="rect">
+            <a:avLst/>
+          </a:prstGeom>
+          <a:noFill/>
+        </p:spPr>
+        <p:txBody>
+          <a:bodyPr wrap="none" rtlCol="0">
+            <a:spAutoFit/>
+          </a:bodyPr>
+          <a:lstStyle/>
+          <a:p>
+            <a:r>
+              <a:rPr lang="en-US" altLang="ko-KR" sz="1200" dirty="0" err="1" smtClean="0">
+                <a:solidFill>
+                  <a:srgbClr val="FF0000"/>
+                </a:solidFill>
+              </a:rPr>
+              <a:t>EventLoop</a:t>
+            </a:r>
+            <a:r>
+              <a:rPr lang="en-US" altLang="ko-KR" sz="1200" dirty="0" smtClean="0">
+                <a:solidFill>
+                  <a:srgbClr val="FF0000"/>
+                </a:solidFill>
+              </a:rPr>
+              <a:t> Lock</a:t>
+            </a:r>
+            <a:endParaRPr lang="ko-KR" altLang="en-US" dirty="0">
+              <a:solidFill>
+                <a:srgbClr val="FF0000"/>
+              </a:solidFill>
+            </a:endParaRPr>
+          </a:p>
+        </p:txBody>
+      </p:sp>
+      <p:sp>
+        <p:nvSpPr>
+          <p:cNvPr id="55" name="직사각형 54"/>
+          <p:cNvSpPr/>
+          <p:nvPr/>
+        </p:nvSpPr>
+        <p:spPr>
+          <a:xfrm>
+            <a:off x="2529569" y="3986887"/>
+            <a:ext cx="4237264" cy="1194713"/>
+          </a:xfrm>
+          <a:prstGeom prst="rect">
+            <a:avLst/>
+          </a:prstGeom>
+        </p:spPr>
+        <p:style>
+          <a:lnRef idx="2">
+            <a:schemeClr val="accent1">
+              <a:shade val="50000"/>
+            </a:schemeClr>
+          </a:lnRef>
+          <a:fillRef idx="1">
+            <a:schemeClr val="accent1"/>
+          </a:fillRef>
+          <a:effectRef idx="0">
+            <a:schemeClr val="accent1"/>
+          </a:effectRef>
+          <a:fontRef idx="minor">
+            <a:schemeClr val="lt1"/>
+          </a:fontRef>
+        </p:style>
+        <p:txBody>
+          <a:bodyPr rtlCol="0" anchor="ctr"/>
+          <a:lstStyle/>
+          <a:p>
+            <a:pPr lvl="0" eaLnBrk="0" fontAlgn="base" latinLnBrk="0" hangingPunct="0">
+              <a:spcBef>
+                <a:spcPct val="0"/>
+              </a:spcBef>
+              <a:spcAft>
+                <a:spcPct val="0"/>
+              </a:spcAft>
+            </a:pPr>
+            <a:r>
+              <a:rPr lang="ko-KR" altLang="ko-KR" sz="900" dirty="0">
+                <a:solidFill>
+                  <a:schemeClr val="bg1"/>
+                </a:solidFill>
+                <a:latin typeface="D2Coding" panose="020B0609020101020101" pitchFamily="49" charset="-127"/>
+                <a:ea typeface="D2Coding" panose="020B0609020101020101" pitchFamily="49" charset="-127"/>
+              </a:rPr>
+              <a:t>_</a:t>
+            </a:r>
+            <a:r>
+              <a:rPr lang="ko-KR" altLang="ko-KR" sz="900" dirty="0" err="1" smtClean="0">
+                <a:solidFill>
+                  <a:schemeClr val="bg1"/>
+                </a:solidFill>
+                <a:latin typeface="D2Coding" panose="020B0609020101020101" pitchFamily="49" charset="-127"/>
+                <a:ea typeface="D2Coding" panose="020B0609020101020101" pitchFamily="49" charset="-127"/>
+              </a:rPr>
+              <a:t>on_receive_tr_data</a:t>
+            </a:r>
+            <a:endParaRPr lang="en-US" altLang="ko-KR" sz="900" dirty="0" smtClean="0">
+              <a:solidFill>
+                <a:schemeClr val="bg1"/>
+              </a:solidFill>
+              <a:latin typeface="D2Coding" panose="020B0609020101020101" pitchFamily="49" charset="-127"/>
+              <a:ea typeface="D2Coding" panose="020B0609020101020101" pitchFamily="49" charset="-127"/>
+            </a:endParaRPr>
+          </a:p>
+          <a:p>
+            <a:pPr lvl="0" eaLnBrk="0" fontAlgn="base" latinLnBrk="0" hangingPunct="0">
+              <a:spcBef>
+                <a:spcPct val="0"/>
+              </a:spcBef>
+              <a:spcAft>
+                <a:spcPct val="0"/>
+              </a:spcAft>
+            </a:pPr>
+            <a:endParaRPr lang="en-US" altLang="ko-KR" sz="900" dirty="0">
+              <a:solidFill>
+                <a:schemeClr val="bg1"/>
+              </a:solidFill>
+              <a:latin typeface="D2Coding" panose="020B0609020101020101" pitchFamily="49" charset="-127"/>
+              <a:ea typeface="D2Coding" panose="020B0609020101020101" pitchFamily="49" charset="-127"/>
+            </a:endParaRPr>
+          </a:p>
+          <a:p>
+            <a:pPr lvl="0" eaLnBrk="0" fontAlgn="base" latinLnBrk="0" hangingPunct="0">
+              <a:spcBef>
+                <a:spcPct val="0"/>
+              </a:spcBef>
+              <a:spcAft>
+                <a:spcPct val="0"/>
+              </a:spcAft>
+            </a:pPr>
+            <a:endParaRPr lang="en-US" altLang="ko-KR" sz="900" dirty="0" smtClean="0">
+              <a:solidFill>
+                <a:schemeClr val="bg1"/>
+              </a:solidFill>
+              <a:latin typeface="D2Coding" panose="020B0609020101020101" pitchFamily="49" charset="-127"/>
+              <a:ea typeface="D2Coding" panose="020B0609020101020101" pitchFamily="49" charset="-127"/>
+            </a:endParaRPr>
+          </a:p>
+          <a:p>
+            <a:pPr lvl="0" eaLnBrk="0" fontAlgn="base" latinLnBrk="0" hangingPunct="0">
+              <a:spcBef>
+                <a:spcPct val="0"/>
+              </a:spcBef>
+              <a:spcAft>
+                <a:spcPct val="0"/>
+              </a:spcAft>
+            </a:pPr>
+            <a:endParaRPr lang="en-US" altLang="ko-KR" sz="900" dirty="0">
+              <a:solidFill>
+                <a:schemeClr val="bg1"/>
+              </a:solidFill>
+              <a:latin typeface="D2Coding" panose="020B0609020101020101" pitchFamily="49" charset="-127"/>
+              <a:ea typeface="D2Coding" panose="020B0609020101020101" pitchFamily="49" charset="-127"/>
+            </a:endParaRPr>
+          </a:p>
+          <a:p>
+            <a:pPr lvl="0" eaLnBrk="0" fontAlgn="base" latinLnBrk="0" hangingPunct="0">
+              <a:spcBef>
+                <a:spcPct val="0"/>
+              </a:spcBef>
+              <a:spcAft>
+                <a:spcPct val="0"/>
+              </a:spcAft>
+            </a:pPr>
+            <a:endParaRPr lang="en-US" altLang="ko-KR" sz="900" dirty="0" smtClean="0">
+              <a:solidFill>
+                <a:schemeClr val="bg1"/>
+              </a:solidFill>
+              <a:latin typeface="D2Coding" panose="020B0609020101020101" pitchFamily="49" charset="-127"/>
+              <a:ea typeface="D2Coding" panose="020B0609020101020101" pitchFamily="49" charset="-127"/>
+            </a:endParaRPr>
+          </a:p>
+          <a:p>
+            <a:pPr lvl="0" eaLnBrk="0" fontAlgn="base" latinLnBrk="0" hangingPunct="0">
+              <a:spcBef>
+                <a:spcPct val="0"/>
+              </a:spcBef>
+              <a:spcAft>
+                <a:spcPct val="0"/>
+              </a:spcAft>
+            </a:pPr>
+            <a:endParaRPr lang="en-US" altLang="ko-KR" sz="900" dirty="0">
+              <a:solidFill>
+                <a:schemeClr val="bg1"/>
+              </a:solidFill>
+              <a:latin typeface="D2Coding" panose="020B0609020101020101" pitchFamily="49" charset="-127"/>
+              <a:ea typeface="D2Coding" panose="020B0609020101020101" pitchFamily="49" charset="-127"/>
+            </a:endParaRPr>
+          </a:p>
+          <a:p>
+            <a:pPr lvl="0" eaLnBrk="0" fontAlgn="base" latinLnBrk="0" hangingPunct="0">
+              <a:spcBef>
+                <a:spcPct val="0"/>
+              </a:spcBef>
+              <a:spcAft>
+                <a:spcPct val="0"/>
+              </a:spcAft>
+            </a:pPr>
+            <a:endParaRPr lang="en-US" altLang="ko-KR" sz="900" dirty="0" smtClean="0">
+              <a:solidFill>
+                <a:schemeClr val="bg1"/>
+              </a:solidFill>
+              <a:latin typeface="D2Coding" panose="020B0609020101020101" pitchFamily="49" charset="-127"/>
+              <a:ea typeface="D2Coding" panose="020B0609020101020101" pitchFamily="49" charset="-127"/>
+            </a:endParaRPr>
+          </a:p>
+        </p:txBody>
+      </p:sp>
+      <p:sp>
+        <p:nvSpPr>
+          <p:cNvPr id="53" name="직사각형 52"/>
+          <p:cNvSpPr/>
+          <p:nvPr/>
+        </p:nvSpPr>
+        <p:spPr>
+          <a:xfrm>
+            <a:off x="2769050" y="4392994"/>
+            <a:ext cx="4328431" cy="310242"/>
+          </a:xfrm>
+          <a:prstGeom prst="rect">
+            <a:avLst/>
+          </a:prstGeom>
+        </p:spPr>
+        <p:style>
+          <a:lnRef idx="2">
+            <a:schemeClr val="accent1">
+              <a:shade val="50000"/>
+            </a:schemeClr>
+          </a:lnRef>
+          <a:fillRef idx="1">
+            <a:schemeClr val="accent1"/>
+          </a:fillRef>
+          <a:effectRef idx="0">
+            <a:schemeClr val="accent1"/>
+          </a:effectRef>
+          <a:fontRef idx="minor">
+            <a:schemeClr val="lt1"/>
+          </a:fontRef>
+        </p:style>
+        <p:txBody>
+          <a:bodyPr rtlCol="0" anchor="ctr"/>
+          <a:lstStyle/>
+          <a:p>
+            <a:pPr lvl="0" eaLnBrk="0" fontAlgn="base" latinLnBrk="0" hangingPunct="0">
+              <a:spcBef>
+                <a:spcPct val="0"/>
+              </a:spcBef>
+              <a:spcAft>
+                <a:spcPct val="0"/>
+              </a:spcAft>
+            </a:pPr>
+            <a:r>
+              <a:rPr lang="ko-KR" altLang="ko-KR" sz="900" dirty="0" err="1">
+                <a:solidFill>
+                  <a:schemeClr val="bg1"/>
+                </a:solidFill>
+                <a:latin typeface="D2Coding" panose="020B0609020101020101" pitchFamily="49" charset="-127"/>
+                <a:ea typeface="D2Coding" panose="020B0609020101020101" pitchFamily="49" charset="-127"/>
+              </a:rPr>
+              <a:t>self.dynamicCall</a:t>
+            </a:r>
+            <a:r>
+              <a:rPr lang="ko-KR" altLang="ko-KR" sz="900" dirty="0">
+                <a:solidFill>
+                  <a:schemeClr val="bg1"/>
+                </a:solidFill>
+                <a:latin typeface="D2Coding" panose="020B0609020101020101" pitchFamily="49" charset="-127"/>
+                <a:ea typeface="D2Coding" panose="020B0609020101020101" pitchFamily="49" charset="-127"/>
+              </a:rPr>
+              <a:t>("</a:t>
+            </a:r>
+            <a:r>
+              <a:rPr lang="ko-KR" altLang="ko-KR" sz="900" dirty="0" err="1">
+                <a:solidFill>
+                  <a:schemeClr val="bg1"/>
+                </a:solidFill>
+                <a:latin typeface="D2Coding" panose="020B0609020101020101" pitchFamily="49" charset="-127"/>
+                <a:ea typeface="D2Coding" panose="020B0609020101020101" pitchFamily="49" charset="-127"/>
+              </a:rPr>
+              <a:t>GetCommDataEx</a:t>
+            </a:r>
+            <a:r>
+              <a:rPr lang="ko-KR" altLang="ko-KR" sz="900" dirty="0">
+                <a:solidFill>
+                  <a:schemeClr val="bg1"/>
+                </a:solidFill>
+                <a:latin typeface="D2Coding" panose="020B0609020101020101" pitchFamily="49" charset="-127"/>
+                <a:ea typeface="D2Coding" panose="020B0609020101020101" pitchFamily="49" charset="-127"/>
+              </a:rPr>
+              <a:t>(</a:t>
+            </a:r>
+            <a:r>
+              <a:rPr lang="ko-KR" altLang="ko-KR" sz="900" dirty="0" err="1">
+                <a:solidFill>
+                  <a:schemeClr val="bg1"/>
+                </a:solidFill>
+                <a:latin typeface="D2Coding" panose="020B0609020101020101" pitchFamily="49" charset="-127"/>
+                <a:ea typeface="D2Coding" panose="020B0609020101020101" pitchFamily="49" charset="-127"/>
+              </a:rPr>
+              <a:t>QString</a:t>
+            </a:r>
+            <a:r>
+              <a:rPr lang="ko-KR" altLang="ko-KR" sz="900" dirty="0">
+                <a:solidFill>
+                  <a:schemeClr val="bg1"/>
+                </a:solidFill>
+                <a:latin typeface="D2Coding" panose="020B0609020101020101" pitchFamily="49" charset="-127"/>
+                <a:ea typeface="D2Coding" panose="020B0609020101020101" pitchFamily="49" charset="-127"/>
+              </a:rPr>
+              <a:t>, </a:t>
+            </a:r>
+            <a:r>
+              <a:rPr lang="ko-KR" altLang="ko-KR" sz="900" dirty="0" err="1">
+                <a:solidFill>
+                  <a:schemeClr val="bg1"/>
+                </a:solidFill>
+                <a:latin typeface="D2Coding" panose="020B0609020101020101" pitchFamily="49" charset="-127"/>
+                <a:ea typeface="D2Coding" panose="020B0609020101020101" pitchFamily="49" charset="-127"/>
+              </a:rPr>
+              <a:t>QString</a:t>
+            </a:r>
+            <a:r>
+              <a:rPr lang="ko-KR" altLang="ko-KR" sz="900" dirty="0">
+                <a:solidFill>
+                  <a:schemeClr val="bg1"/>
+                </a:solidFill>
+                <a:latin typeface="D2Coding" panose="020B0609020101020101" pitchFamily="49" charset="-127"/>
+                <a:ea typeface="D2Coding" panose="020B0609020101020101" pitchFamily="49" charset="-127"/>
+              </a:rPr>
+              <a:t>", </a:t>
+            </a:r>
+            <a:r>
+              <a:rPr lang="ko-KR" altLang="ko-KR" sz="900" dirty="0" err="1">
+                <a:solidFill>
+                  <a:schemeClr val="bg1"/>
+                </a:solidFill>
+                <a:latin typeface="D2Coding" panose="020B0609020101020101" pitchFamily="49" charset="-127"/>
+                <a:ea typeface="D2Coding" panose="020B0609020101020101" pitchFamily="49" charset="-127"/>
+              </a:rPr>
+              <a:t>trcode</a:t>
+            </a:r>
+            <a:r>
+              <a:rPr lang="ko-KR" altLang="ko-KR" sz="900" dirty="0">
+                <a:solidFill>
+                  <a:schemeClr val="bg1"/>
+                </a:solidFill>
+                <a:latin typeface="D2Coding" panose="020B0609020101020101" pitchFamily="49" charset="-127"/>
+                <a:ea typeface="D2Coding" panose="020B0609020101020101" pitchFamily="49" charset="-127"/>
+              </a:rPr>
+              <a:t>, </a:t>
+            </a:r>
+            <a:r>
+              <a:rPr lang="ko-KR" altLang="ko-KR" sz="900" dirty="0" err="1">
+                <a:solidFill>
+                  <a:schemeClr val="bg1"/>
+                </a:solidFill>
+                <a:latin typeface="D2Coding" panose="020B0609020101020101" pitchFamily="49" charset="-127"/>
+                <a:ea typeface="D2Coding" panose="020B0609020101020101" pitchFamily="49" charset="-127"/>
+              </a:rPr>
+              <a:t>output_name</a:t>
+            </a:r>
+            <a:r>
+              <a:rPr lang="ko-KR" altLang="ko-KR" sz="900" dirty="0">
+                <a:solidFill>
+                  <a:schemeClr val="bg1"/>
+                </a:solidFill>
+                <a:latin typeface="D2Coding" panose="020B0609020101020101" pitchFamily="49" charset="-127"/>
+                <a:ea typeface="D2Coding" panose="020B0609020101020101" pitchFamily="49" charset="-127"/>
+              </a:rPr>
+              <a:t>)</a:t>
+            </a:r>
+          </a:p>
+        </p:txBody>
+      </p:sp>
+      <p:sp>
+        <p:nvSpPr>
+          <p:cNvPr id="58" name="TextBox 57"/>
+          <p:cNvSpPr txBox="1"/>
+          <p:nvPr/>
+        </p:nvSpPr>
+        <p:spPr>
+          <a:xfrm>
+            <a:off x="2721427" y="4797989"/>
+            <a:ext cx="1491883" cy="276999"/>
+          </a:xfrm>
+          <a:prstGeom prst="rect">
+            <a:avLst/>
+          </a:prstGeom>
+          <a:noFill/>
+        </p:spPr>
+        <p:txBody>
+          <a:bodyPr wrap="none" rtlCol="0">
+            <a:spAutoFit/>
+          </a:bodyPr>
+          <a:lstStyle/>
+          <a:p>
+            <a:r>
+              <a:rPr lang="en-US" altLang="ko-KR" sz="1200" dirty="0" err="1" smtClean="0">
+                <a:solidFill>
+                  <a:srgbClr val="FF0000"/>
+                </a:solidFill>
+              </a:rPr>
+              <a:t>EventLoop</a:t>
+            </a:r>
+            <a:r>
+              <a:rPr lang="en-US" altLang="ko-KR" sz="1200" dirty="0">
+                <a:solidFill>
+                  <a:srgbClr val="FF0000"/>
+                </a:solidFill>
+              </a:rPr>
+              <a:t> </a:t>
+            </a:r>
+            <a:r>
+              <a:rPr lang="en-US" altLang="ko-KR" sz="1200" dirty="0" smtClean="0">
+                <a:solidFill>
+                  <a:srgbClr val="FF0000"/>
+                </a:solidFill>
+              </a:rPr>
+              <a:t>Release</a:t>
+            </a:r>
+            <a:endParaRPr lang="ko-KR" altLang="en-US" dirty="0">
+              <a:solidFill>
+                <a:srgbClr val="FF0000"/>
+              </a:solidFill>
+            </a:endParaRPr>
+          </a:p>
+        </p:txBody>
+      </p:sp>
+      <p:cxnSp>
+        <p:nvCxnSpPr>
+          <p:cNvPr id="27" name="직선 화살표 연결선 26"/>
+          <p:cNvCxnSpPr/>
+          <p:nvPr/>
+        </p:nvCxnSpPr>
+        <p:spPr>
+          <a:xfrm>
+            <a:off x="1295400" y="844122"/>
+            <a:ext cx="1234169" cy="0"/>
+          </a:xfrm>
+          <a:prstGeom prst="straightConnector1">
+            <a:avLst/>
+          </a:prstGeom>
+          <a:ln w="25400">
+            <a:solidFill>
+              <a:schemeClr val="tx1"/>
+            </a:solidFill>
+            <a:headEnd w="lg" len="lg"/>
+            <a:tailEnd type="stealth"/>
+          </a:ln>
+        </p:spPr>
+        <p:style>
+          <a:lnRef idx="1">
+            <a:schemeClr val="accent1"/>
+          </a:lnRef>
+          <a:fillRef idx="0">
+            <a:schemeClr val="accent1"/>
+          </a:fillRef>
+          <a:effectRef idx="0">
+            <a:schemeClr val="accent1"/>
+          </a:effectRef>
+          <a:fontRef idx="minor">
+            <a:schemeClr val="tx1"/>
+          </a:fontRef>
+        </p:style>
+      </p:cxnSp>
+      <p:sp>
+        <p:nvSpPr>
+          <p:cNvPr id="65" name="직사각형 64"/>
+          <p:cNvSpPr/>
+          <p:nvPr/>
+        </p:nvSpPr>
+        <p:spPr>
+          <a:xfrm>
+            <a:off x="2529569" y="844122"/>
+            <a:ext cx="4237264" cy="2142772"/>
+          </a:xfrm>
+          <a:prstGeom prst="rect">
+            <a:avLst/>
+          </a:prstGeom>
+        </p:spPr>
+        <p:style>
+          <a:lnRef idx="2">
+            <a:schemeClr val="accent1">
+              <a:shade val="50000"/>
+            </a:schemeClr>
+          </a:lnRef>
+          <a:fillRef idx="1">
+            <a:schemeClr val="accent1"/>
+          </a:fillRef>
+          <a:effectRef idx="0">
+            <a:schemeClr val="accent1"/>
+          </a:effectRef>
+          <a:fontRef idx="minor">
+            <a:schemeClr val="lt1"/>
+          </a:fontRef>
+        </p:style>
+        <p:txBody>
+          <a:bodyPr rtlCol="0" anchor="ctr"/>
+          <a:lstStyle/>
+          <a:p>
+            <a:pPr lvl="0" eaLnBrk="0" fontAlgn="base" latinLnBrk="0" hangingPunct="0">
+              <a:spcBef>
+                <a:spcPct val="0"/>
+              </a:spcBef>
+              <a:spcAft>
+                <a:spcPct val="0"/>
+              </a:spcAft>
+            </a:pPr>
+            <a:r>
+              <a:rPr lang="en-US" altLang="ko-KR" sz="900" dirty="0" smtClean="0">
+                <a:solidFill>
+                  <a:schemeClr val="bg1"/>
+                </a:solidFill>
+                <a:latin typeface="D2Coding" panose="020B0609020101020101" pitchFamily="49" charset="-127"/>
+                <a:ea typeface="D2Coding" panose="020B0609020101020101" pitchFamily="49" charset="-127"/>
+              </a:rPr>
+              <a:t>User Request Function</a:t>
+            </a:r>
+          </a:p>
+          <a:p>
+            <a:pPr lvl="0" eaLnBrk="0" fontAlgn="base" latinLnBrk="0" hangingPunct="0">
+              <a:spcBef>
+                <a:spcPct val="0"/>
+              </a:spcBef>
+              <a:spcAft>
+                <a:spcPct val="0"/>
+              </a:spcAft>
+            </a:pPr>
+            <a:endParaRPr lang="en-US" altLang="ko-KR" sz="900" dirty="0">
+              <a:solidFill>
+                <a:schemeClr val="bg1"/>
+              </a:solidFill>
+              <a:latin typeface="D2Coding" panose="020B0609020101020101" pitchFamily="49" charset="-127"/>
+              <a:ea typeface="D2Coding" panose="020B0609020101020101" pitchFamily="49" charset="-127"/>
+            </a:endParaRPr>
+          </a:p>
+          <a:p>
+            <a:pPr lvl="0" eaLnBrk="0" fontAlgn="base" latinLnBrk="0" hangingPunct="0">
+              <a:spcBef>
+                <a:spcPct val="0"/>
+              </a:spcBef>
+              <a:spcAft>
+                <a:spcPct val="0"/>
+              </a:spcAft>
+            </a:pPr>
+            <a:endParaRPr lang="en-US" altLang="ko-KR" sz="900" dirty="0" smtClean="0">
+              <a:solidFill>
+                <a:schemeClr val="bg1"/>
+              </a:solidFill>
+              <a:latin typeface="D2Coding" panose="020B0609020101020101" pitchFamily="49" charset="-127"/>
+              <a:ea typeface="D2Coding" panose="020B0609020101020101" pitchFamily="49" charset="-127"/>
+            </a:endParaRPr>
+          </a:p>
+          <a:p>
+            <a:pPr lvl="0" eaLnBrk="0" fontAlgn="base" latinLnBrk="0" hangingPunct="0">
+              <a:spcBef>
+                <a:spcPct val="0"/>
+              </a:spcBef>
+              <a:spcAft>
+                <a:spcPct val="0"/>
+              </a:spcAft>
+            </a:pPr>
+            <a:endParaRPr lang="en-US" altLang="ko-KR" sz="900" dirty="0">
+              <a:solidFill>
+                <a:schemeClr val="bg1"/>
+              </a:solidFill>
+              <a:latin typeface="D2Coding" panose="020B0609020101020101" pitchFamily="49" charset="-127"/>
+              <a:ea typeface="D2Coding" panose="020B0609020101020101" pitchFamily="49" charset="-127"/>
+            </a:endParaRPr>
+          </a:p>
+          <a:p>
+            <a:pPr lvl="0" eaLnBrk="0" fontAlgn="base" latinLnBrk="0" hangingPunct="0">
+              <a:spcBef>
+                <a:spcPct val="0"/>
+              </a:spcBef>
+              <a:spcAft>
+                <a:spcPct val="0"/>
+              </a:spcAft>
+            </a:pPr>
+            <a:endParaRPr lang="en-US" altLang="ko-KR" sz="900" dirty="0" smtClean="0">
+              <a:solidFill>
+                <a:schemeClr val="bg1"/>
+              </a:solidFill>
+              <a:latin typeface="D2Coding" panose="020B0609020101020101" pitchFamily="49" charset="-127"/>
+              <a:ea typeface="D2Coding" panose="020B0609020101020101" pitchFamily="49" charset="-127"/>
+            </a:endParaRPr>
+          </a:p>
+          <a:p>
+            <a:pPr lvl="0" eaLnBrk="0" fontAlgn="base" latinLnBrk="0" hangingPunct="0">
+              <a:spcBef>
+                <a:spcPct val="0"/>
+              </a:spcBef>
+              <a:spcAft>
+                <a:spcPct val="0"/>
+              </a:spcAft>
+            </a:pPr>
+            <a:endParaRPr lang="en-US" altLang="ko-KR" sz="900" dirty="0">
+              <a:solidFill>
+                <a:schemeClr val="bg1"/>
+              </a:solidFill>
+              <a:latin typeface="D2Coding" panose="020B0609020101020101" pitchFamily="49" charset="-127"/>
+              <a:ea typeface="D2Coding" panose="020B0609020101020101" pitchFamily="49" charset="-127"/>
+            </a:endParaRPr>
+          </a:p>
+          <a:p>
+            <a:pPr lvl="0" eaLnBrk="0" fontAlgn="base" latinLnBrk="0" hangingPunct="0">
+              <a:spcBef>
+                <a:spcPct val="0"/>
+              </a:spcBef>
+              <a:spcAft>
+                <a:spcPct val="0"/>
+              </a:spcAft>
+            </a:pPr>
+            <a:endParaRPr lang="en-US" altLang="ko-KR" sz="900" dirty="0" smtClean="0">
+              <a:solidFill>
+                <a:schemeClr val="bg1"/>
+              </a:solidFill>
+              <a:latin typeface="D2Coding" panose="020B0609020101020101" pitchFamily="49" charset="-127"/>
+              <a:ea typeface="D2Coding" panose="020B0609020101020101" pitchFamily="49" charset="-127"/>
+            </a:endParaRPr>
+          </a:p>
+          <a:p>
+            <a:pPr lvl="0" eaLnBrk="0" fontAlgn="base" latinLnBrk="0" hangingPunct="0">
+              <a:spcBef>
+                <a:spcPct val="0"/>
+              </a:spcBef>
+              <a:spcAft>
+                <a:spcPct val="0"/>
+              </a:spcAft>
+            </a:pPr>
+            <a:endParaRPr lang="en-US" altLang="ko-KR" sz="900" dirty="0">
+              <a:solidFill>
+                <a:schemeClr val="bg1"/>
+              </a:solidFill>
+              <a:latin typeface="D2Coding" panose="020B0609020101020101" pitchFamily="49" charset="-127"/>
+              <a:ea typeface="D2Coding" panose="020B0609020101020101" pitchFamily="49" charset="-127"/>
+            </a:endParaRPr>
+          </a:p>
+          <a:p>
+            <a:pPr lvl="0" eaLnBrk="0" fontAlgn="base" latinLnBrk="0" hangingPunct="0">
+              <a:spcBef>
+                <a:spcPct val="0"/>
+              </a:spcBef>
+              <a:spcAft>
+                <a:spcPct val="0"/>
+              </a:spcAft>
+            </a:pPr>
+            <a:endParaRPr lang="en-US" altLang="ko-KR" sz="900" dirty="0" smtClean="0">
+              <a:solidFill>
+                <a:schemeClr val="bg1"/>
+              </a:solidFill>
+              <a:latin typeface="D2Coding" panose="020B0609020101020101" pitchFamily="49" charset="-127"/>
+              <a:ea typeface="D2Coding" panose="020B0609020101020101" pitchFamily="49" charset="-127"/>
+            </a:endParaRPr>
+          </a:p>
+          <a:p>
+            <a:pPr lvl="0" eaLnBrk="0" fontAlgn="base" latinLnBrk="0" hangingPunct="0">
+              <a:spcBef>
+                <a:spcPct val="0"/>
+              </a:spcBef>
+              <a:spcAft>
+                <a:spcPct val="0"/>
+              </a:spcAft>
+            </a:pPr>
+            <a:endParaRPr lang="en-US" altLang="ko-KR" sz="900" dirty="0" smtClean="0">
+              <a:solidFill>
+                <a:schemeClr val="bg1"/>
+              </a:solidFill>
+              <a:latin typeface="D2Coding" panose="020B0609020101020101" pitchFamily="49" charset="-127"/>
+              <a:ea typeface="D2Coding" panose="020B0609020101020101" pitchFamily="49" charset="-127"/>
+            </a:endParaRPr>
+          </a:p>
+          <a:p>
+            <a:pPr lvl="0" eaLnBrk="0" fontAlgn="base" latinLnBrk="0" hangingPunct="0">
+              <a:spcBef>
+                <a:spcPct val="0"/>
+              </a:spcBef>
+              <a:spcAft>
+                <a:spcPct val="0"/>
+              </a:spcAft>
+            </a:pPr>
+            <a:endParaRPr lang="en-US" altLang="ko-KR" sz="900" dirty="0">
+              <a:solidFill>
+                <a:schemeClr val="bg1"/>
+              </a:solidFill>
+              <a:latin typeface="D2Coding" panose="020B0609020101020101" pitchFamily="49" charset="-127"/>
+              <a:ea typeface="D2Coding" panose="020B0609020101020101" pitchFamily="49" charset="-127"/>
+            </a:endParaRPr>
+          </a:p>
+          <a:p>
+            <a:pPr lvl="0" eaLnBrk="0" fontAlgn="base" latinLnBrk="0" hangingPunct="0">
+              <a:spcBef>
+                <a:spcPct val="0"/>
+              </a:spcBef>
+              <a:spcAft>
+                <a:spcPct val="0"/>
+              </a:spcAft>
+            </a:pPr>
+            <a:endParaRPr lang="en-US" altLang="ko-KR" sz="900" dirty="0" smtClean="0">
+              <a:solidFill>
+                <a:schemeClr val="bg1"/>
+              </a:solidFill>
+              <a:latin typeface="D2Coding" panose="020B0609020101020101" pitchFamily="49" charset="-127"/>
+              <a:ea typeface="D2Coding" panose="020B0609020101020101" pitchFamily="49" charset="-127"/>
+            </a:endParaRPr>
+          </a:p>
+          <a:p>
+            <a:pPr lvl="0" eaLnBrk="0" fontAlgn="base" latinLnBrk="0" hangingPunct="0">
+              <a:spcBef>
+                <a:spcPct val="0"/>
+              </a:spcBef>
+              <a:spcAft>
+                <a:spcPct val="0"/>
+              </a:spcAft>
+            </a:pPr>
+            <a:endParaRPr lang="en-US" altLang="ko-KR" sz="900" dirty="0">
+              <a:solidFill>
+                <a:schemeClr val="bg1"/>
+              </a:solidFill>
+              <a:latin typeface="D2Coding" panose="020B0609020101020101" pitchFamily="49" charset="-127"/>
+              <a:ea typeface="D2Coding" panose="020B0609020101020101" pitchFamily="49" charset="-127"/>
+            </a:endParaRPr>
+          </a:p>
+          <a:p>
+            <a:pPr lvl="0" eaLnBrk="0" fontAlgn="base" latinLnBrk="0" hangingPunct="0">
+              <a:spcBef>
+                <a:spcPct val="0"/>
+              </a:spcBef>
+              <a:spcAft>
+                <a:spcPct val="0"/>
+              </a:spcAft>
+            </a:pPr>
+            <a:endParaRPr lang="ko-KR" altLang="ko-KR" sz="900" dirty="0">
+              <a:solidFill>
+                <a:schemeClr val="bg1"/>
+              </a:solidFill>
+              <a:latin typeface="D2Coding" panose="020B0609020101020101" pitchFamily="49" charset="-127"/>
+              <a:ea typeface="D2Coding" panose="020B0609020101020101" pitchFamily="49" charset="-127"/>
+            </a:endParaRPr>
+          </a:p>
+        </p:txBody>
+      </p:sp>
+      <p:sp>
+        <p:nvSpPr>
+          <p:cNvPr id="5" name="직사각형 4"/>
+          <p:cNvSpPr/>
+          <p:nvPr/>
+        </p:nvSpPr>
+        <p:spPr>
+          <a:xfrm>
+            <a:off x="2721428" y="1259309"/>
+            <a:ext cx="5128530" cy="310242"/>
+          </a:xfrm>
+          <a:prstGeom prst="rect">
+            <a:avLst/>
+          </a:prstGeom>
+        </p:spPr>
+        <p:style>
+          <a:lnRef idx="2">
+            <a:schemeClr val="accent6">
+              <a:shade val="50000"/>
+            </a:schemeClr>
+          </a:lnRef>
+          <a:fillRef idx="1">
+            <a:schemeClr val="accent6"/>
+          </a:fillRef>
+          <a:effectRef idx="0">
+            <a:schemeClr val="accent6"/>
+          </a:effectRef>
+          <a:fontRef idx="minor">
+            <a:schemeClr val="lt1"/>
+          </a:fontRef>
+        </p:style>
+        <p:txBody>
+          <a:bodyPr rtlCol="0" anchor="ctr"/>
+          <a:lstStyle/>
+          <a:p>
+            <a:pPr lvl="0" algn="ctr"/>
+            <a:r>
+              <a:rPr lang="ko-KR" altLang="ko-KR" sz="900" dirty="0" err="1" smtClean="0">
+                <a:solidFill>
+                  <a:schemeClr val="bg1"/>
+                </a:solidFill>
+                <a:latin typeface="D2Coding" panose="020B0609020101020101" pitchFamily="49" charset="-127"/>
+                <a:ea typeface="D2Coding" panose="020B0609020101020101" pitchFamily="49" charset="-127"/>
+              </a:rPr>
+              <a:t>SetInputValue</a:t>
+            </a:r>
+            <a:r>
+              <a:rPr lang="ko-KR" altLang="ko-KR" sz="900" dirty="0" smtClean="0">
+                <a:solidFill>
+                  <a:schemeClr val="bg1"/>
+                </a:solidFill>
+                <a:latin typeface="D2Coding" panose="020B0609020101020101" pitchFamily="49" charset="-127"/>
+                <a:ea typeface="D2Coding" panose="020B0609020101020101" pitchFamily="49" charset="-127"/>
+              </a:rPr>
+              <a:t>(</a:t>
+            </a:r>
+            <a:r>
+              <a:rPr lang="ko-KR" altLang="ko-KR" sz="900" dirty="0" err="1" smtClean="0">
+                <a:solidFill>
+                  <a:schemeClr val="bg1"/>
+                </a:solidFill>
+                <a:latin typeface="D2Coding" panose="020B0609020101020101" pitchFamily="49" charset="-127"/>
+                <a:ea typeface="D2Coding" panose="020B0609020101020101" pitchFamily="49" charset="-127"/>
+              </a:rPr>
+              <a:t>QString</a:t>
+            </a:r>
+            <a:r>
+              <a:rPr lang="ko-KR" altLang="ko-KR" sz="900" dirty="0">
+                <a:solidFill>
+                  <a:schemeClr val="bg1"/>
+                </a:solidFill>
+                <a:latin typeface="D2Coding" panose="020B0609020101020101" pitchFamily="49" charset="-127"/>
+                <a:ea typeface="D2Coding" panose="020B0609020101020101" pitchFamily="49" charset="-127"/>
+              </a:rPr>
+              <a:t>, </a:t>
+            </a:r>
+            <a:r>
+              <a:rPr lang="ko-KR" altLang="ko-KR" sz="900" dirty="0" err="1">
+                <a:solidFill>
+                  <a:schemeClr val="bg1"/>
+                </a:solidFill>
+                <a:latin typeface="D2Coding" panose="020B0609020101020101" pitchFamily="49" charset="-127"/>
+                <a:ea typeface="D2Coding" panose="020B0609020101020101" pitchFamily="49" charset="-127"/>
+              </a:rPr>
+              <a:t>QString</a:t>
+            </a:r>
+            <a:r>
+              <a:rPr lang="ko-KR" altLang="ko-KR" sz="900" dirty="0">
+                <a:solidFill>
+                  <a:schemeClr val="bg1"/>
+                </a:solidFill>
+                <a:latin typeface="D2Coding" panose="020B0609020101020101" pitchFamily="49" charset="-127"/>
+                <a:ea typeface="D2Coding" panose="020B0609020101020101" pitchFamily="49" charset="-127"/>
+              </a:rPr>
+              <a:t>)", </a:t>
+            </a:r>
+            <a:r>
+              <a:rPr lang="ko-KR" altLang="ko-KR" sz="900" dirty="0" err="1">
+                <a:solidFill>
+                  <a:schemeClr val="bg1"/>
+                </a:solidFill>
+                <a:latin typeface="D2Coding" panose="020B0609020101020101" pitchFamily="49" charset="-127"/>
+                <a:ea typeface="D2Coding" panose="020B0609020101020101" pitchFamily="49" charset="-127"/>
+              </a:rPr>
+              <a:t>id</a:t>
+            </a:r>
+            <a:r>
+              <a:rPr lang="ko-KR" altLang="ko-KR" sz="900" dirty="0">
+                <a:solidFill>
+                  <a:schemeClr val="bg1"/>
+                </a:solidFill>
+                <a:latin typeface="D2Coding" panose="020B0609020101020101" pitchFamily="49" charset="-127"/>
+                <a:ea typeface="D2Coding" panose="020B0609020101020101" pitchFamily="49" charset="-127"/>
+              </a:rPr>
+              <a:t>, </a:t>
+            </a:r>
+            <a:r>
+              <a:rPr lang="ko-KR" altLang="ko-KR" sz="900" dirty="0" err="1" smtClean="0">
+                <a:solidFill>
+                  <a:schemeClr val="bg1"/>
+                </a:solidFill>
+                <a:latin typeface="D2Coding" panose="020B0609020101020101" pitchFamily="49" charset="-127"/>
+                <a:ea typeface="D2Coding" panose="020B0609020101020101" pitchFamily="49" charset="-127"/>
+              </a:rPr>
+              <a:t>value</a:t>
+            </a:r>
+            <a:endParaRPr lang="ko-KR" altLang="ko-KR" sz="900" dirty="0">
+              <a:solidFill>
+                <a:schemeClr val="bg1"/>
+              </a:solidFill>
+              <a:latin typeface="Arial" panose="020B0604020202020204" pitchFamily="34" charset="0"/>
+            </a:endParaRPr>
+          </a:p>
+        </p:txBody>
+      </p:sp>
+      <p:sp>
+        <p:nvSpPr>
+          <p:cNvPr id="42" name="직사각형 41"/>
+          <p:cNvSpPr/>
+          <p:nvPr/>
+        </p:nvSpPr>
+        <p:spPr>
+          <a:xfrm>
+            <a:off x="2721428" y="1679542"/>
+            <a:ext cx="5128530" cy="310242"/>
+          </a:xfrm>
+          <a:prstGeom prst="rect">
+            <a:avLst/>
+          </a:prstGeom>
+        </p:spPr>
+        <p:style>
+          <a:lnRef idx="2">
+            <a:schemeClr val="accent6">
+              <a:shade val="50000"/>
+            </a:schemeClr>
+          </a:lnRef>
+          <a:fillRef idx="1">
+            <a:schemeClr val="accent6"/>
+          </a:fillRef>
+          <a:effectRef idx="0">
+            <a:schemeClr val="accent6"/>
+          </a:effectRef>
+          <a:fontRef idx="minor">
+            <a:schemeClr val="lt1"/>
+          </a:fontRef>
+        </p:style>
+        <p:txBody>
+          <a:bodyPr rtlCol="0" anchor="ctr"/>
+          <a:lstStyle/>
+          <a:p>
+            <a:pPr lvl="0" algn="ctr"/>
+            <a:r>
+              <a:rPr lang="ko-KR" altLang="ko-KR" sz="900" dirty="0" err="1">
+                <a:solidFill>
+                  <a:schemeClr val="bg1"/>
+                </a:solidFill>
+                <a:latin typeface="D2Coding" panose="020B0609020101020101" pitchFamily="49" charset="-127"/>
+                <a:ea typeface="D2Coding" panose="020B0609020101020101" pitchFamily="49" charset="-127"/>
+              </a:rPr>
+              <a:t>SetInputValue</a:t>
+            </a:r>
+            <a:r>
+              <a:rPr lang="ko-KR" altLang="ko-KR" sz="900" dirty="0">
+                <a:solidFill>
+                  <a:schemeClr val="bg1"/>
+                </a:solidFill>
+                <a:latin typeface="D2Coding" panose="020B0609020101020101" pitchFamily="49" charset="-127"/>
+                <a:ea typeface="D2Coding" panose="020B0609020101020101" pitchFamily="49" charset="-127"/>
+              </a:rPr>
+              <a:t>(</a:t>
+            </a:r>
+            <a:r>
+              <a:rPr lang="ko-KR" altLang="ko-KR" sz="900" dirty="0" err="1">
+                <a:solidFill>
+                  <a:schemeClr val="bg1"/>
+                </a:solidFill>
+                <a:latin typeface="D2Coding" panose="020B0609020101020101" pitchFamily="49" charset="-127"/>
+                <a:ea typeface="D2Coding" panose="020B0609020101020101" pitchFamily="49" charset="-127"/>
+              </a:rPr>
+              <a:t>QString</a:t>
+            </a:r>
+            <a:r>
+              <a:rPr lang="ko-KR" altLang="ko-KR" sz="900" dirty="0">
+                <a:solidFill>
+                  <a:schemeClr val="bg1"/>
+                </a:solidFill>
+                <a:latin typeface="D2Coding" panose="020B0609020101020101" pitchFamily="49" charset="-127"/>
+                <a:ea typeface="D2Coding" panose="020B0609020101020101" pitchFamily="49" charset="-127"/>
+              </a:rPr>
+              <a:t>, </a:t>
+            </a:r>
+            <a:r>
+              <a:rPr lang="ko-KR" altLang="ko-KR" sz="900" dirty="0" err="1">
+                <a:solidFill>
+                  <a:schemeClr val="bg1"/>
+                </a:solidFill>
+                <a:latin typeface="D2Coding" panose="020B0609020101020101" pitchFamily="49" charset="-127"/>
+                <a:ea typeface="D2Coding" panose="020B0609020101020101" pitchFamily="49" charset="-127"/>
+              </a:rPr>
+              <a:t>QString</a:t>
+            </a:r>
+            <a:r>
+              <a:rPr lang="ko-KR" altLang="ko-KR" sz="900" dirty="0">
+                <a:solidFill>
+                  <a:schemeClr val="bg1"/>
+                </a:solidFill>
+                <a:latin typeface="D2Coding" panose="020B0609020101020101" pitchFamily="49" charset="-127"/>
+                <a:ea typeface="D2Coding" panose="020B0609020101020101" pitchFamily="49" charset="-127"/>
+              </a:rPr>
+              <a:t>)", </a:t>
+            </a:r>
+            <a:r>
+              <a:rPr lang="ko-KR" altLang="ko-KR" sz="900" dirty="0" err="1">
+                <a:solidFill>
+                  <a:schemeClr val="bg1"/>
+                </a:solidFill>
+                <a:latin typeface="D2Coding" panose="020B0609020101020101" pitchFamily="49" charset="-127"/>
+                <a:ea typeface="D2Coding" panose="020B0609020101020101" pitchFamily="49" charset="-127"/>
+              </a:rPr>
+              <a:t>id</a:t>
+            </a:r>
+            <a:r>
+              <a:rPr lang="ko-KR" altLang="ko-KR" sz="900" dirty="0">
+                <a:solidFill>
+                  <a:schemeClr val="bg1"/>
+                </a:solidFill>
+                <a:latin typeface="D2Coding" panose="020B0609020101020101" pitchFamily="49" charset="-127"/>
+                <a:ea typeface="D2Coding" panose="020B0609020101020101" pitchFamily="49" charset="-127"/>
+              </a:rPr>
+              <a:t>, </a:t>
+            </a:r>
+            <a:r>
+              <a:rPr lang="ko-KR" altLang="ko-KR" sz="900" dirty="0" err="1">
+                <a:solidFill>
+                  <a:schemeClr val="bg1"/>
+                </a:solidFill>
+                <a:latin typeface="D2Coding" panose="020B0609020101020101" pitchFamily="49" charset="-127"/>
+                <a:ea typeface="D2Coding" panose="020B0609020101020101" pitchFamily="49" charset="-127"/>
+              </a:rPr>
+              <a:t>value</a:t>
+            </a:r>
+            <a:endParaRPr lang="ko-KR" altLang="ko-KR" sz="900" dirty="0">
+              <a:solidFill>
+                <a:schemeClr val="bg1"/>
+              </a:solidFill>
+              <a:latin typeface="Arial" panose="020B0604020202020204" pitchFamily="34" charset="0"/>
+            </a:endParaRPr>
+          </a:p>
+        </p:txBody>
+      </p:sp>
+      <p:sp>
+        <p:nvSpPr>
+          <p:cNvPr id="45" name="직사각형 44"/>
+          <p:cNvSpPr/>
+          <p:nvPr/>
+        </p:nvSpPr>
+        <p:spPr>
+          <a:xfrm>
+            <a:off x="2721428" y="2099775"/>
+            <a:ext cx="5128530" cy="310242"/>
+          </a:xfrm>
+          <a:prstGeom prst="rect">
+            <a:avLst/>
+          </a:prstGeom>
+        </p:spPr>
+        <p:style>
+          <a:lnRef idx="2">
+            <a:schemeClr val="accent6">
+              <a:shade val="50000"/>
+            </a:schemeClr>
+          </a:lnRef>
+          <a:fillRef idx="1">
+            <a:schemeClr val="accent6"/>
+          </a:fillRef>
+          <a:effectRef idx="0">
+            <a:schemeClr val="accent6"/>
+          </a:effectRef>
+          <a:fontRef idx="minor">
+            <a:schemeClr val="lt1"/>
+          </a:fontRef>
+        </p:style>
+        <p:txBody>
+          <a:bodyPr rtlCol="0" anchor="ctr"/>
+          <a:lstStyle/>
+          <a:p>
+            <a:pPr lvl="0" algn="ctr"/>
+            <a:r>
+              <a:rPr lang="ko-KR" altLang="ko-KR" sz="900" dirty="0" err="1">
+                <a:solidFill>
+                  <a:schemeClr val="bg1"/>
+                </a:solidFill>
+                <a:latin typeface="D2Coding" panose="020B0609020101020101" pitchFamily="49" charset="-127"/>
+                <a:ea typeface="D2Coding" panose="020B0609020101020101" pitchFamily="49" charset="-127"/>
+              </a:rPr>
+              <a:t>SetInputValue</a:t>
+            </a:r>
+            <a:r>
+              <a:rPr lang="ko-KR" altLang="ko-KR" sz="900" dirty="0">
+                <a:solidFill>
+                  <a:schemeClr val="bg1"/>
+                </a:solidFill>
+                <a:latin typeface="D2Coding" panose="020B0609020101020101" pitchFamily="49" charset="-127"/>
+                <a:ea typeface="D2Coding" panose="020B0609020101020101" pitchFamily="49" charset="-127"/>
+              </a:rPr>
+              <a:t>(</a:t>
+            </a:r>
+            <a:r>
+              <a:rPr lang="ko-KR" altLang="ko-KR" sz="900" dirty="0" err="1">
+                <a:solidFill>
+                  <a:schemeClr val="bg1"/>
+                </a:solidFill>
+                <a:latin typeface="D2Coding" panose="020B0609020101020101" pitchFamily="49" charset="-127"/>
+                <a:ea typeface="D2Coding" panose="020B0609020101020101" pitchFamily="49" charset="-127"/>
+              </a:rPr>
+              <a:t>QString</a:t>
+            </a:r>
+            <a:r>
+              <a:rPr lang="ko-KR" altLang="ko-KR" sz="900" dirty="0">
+                <a:solidFill>
+                  <a:schemeClr val="bg1"/>
+                </a:solidFill>
+                <a:latin typeface="D2Coding" panose="020B0609020101020101" pitchFamily="49" charset="-127"/>
+                <a:ea typeface="D2Coding" panose="020B0609020101020101" pitchFamily="49" charset="-127"/>
+              </a:rPr>
+              <a:t>, </a:t>
+            </a:r>
+            <a:r>
+              <a:rPr lang="ko-KR" altLang="ko-KR" sz="900" dirty="0" err="1">
+                <a:solidFill>
+                  <a:schemeClr val="bg1"/>
+                </a:solidFill>
+                <a:latin typeface="D2Coding" panose="020B0609020101020101" pitchFamily="49" charset="-127"/>
+                <a:ea typeface="D2Coding" panose="020B0609020101020101" pitchFamily="49" charset="-127"/>
+              </a:rPr>
+              <a:t>QString</a:t>
+            </a:r>
+            <a:r>
+              <a:rPr lang="ko-KR" altLang="ko-KR" sz="900" dirty="0">
+                <a:solidFill>
+                  <a:schemeClr val="bg1"/>
+                </a:solidFill>
+                <a:latin typeface="D2Coding" panose="020B0609020101020101" pitchFamily="49" charset="-127"/>
+                <a:ea typeface="D2Coding" panose="020B0609020101020101" pitchFamily="49" charset="-127"/>
+              </a:rPr>
+              <a:t>)", </a:t>
+            </a:r>
+            <a:r>
+              <a:rPr lang="ko-KR" altLang="ko-KR" sz="900" dirty="0" err="1">
+                <a:solidFill>
+                  <a:schemeClr val="bg1"/>
+                </a:solidFill>
+                <a:latin typeface="D2Coding" panose="020B0609020101020101" pitchFamily="49" charset="-127"/>
+                <a:ea typeface="D2Coding" panose="020B0609020101020101" pitchFamily="49" charset="-127"/>
+              </a:rPr>
+              <a:t>id</a:t>
+            </a:r>
+            <a:r>
+              <a:rPr lang="ko-KR" altLang="ko-KR" sz="900" dirty="0">
+                <a:solidFill>
+                  <a:schemeClr val="bg1"/>
+                </a:solidFill>
+                <a:latin typeface="D2Coding" panose="020B0609020101020101" pitchFamily="49" charset="-127"/>
+                <a:ea typeface="D2Coding" panose="020B0609020101020101" pitchFamily="49" charset="-127"/>
+              </a:rPr>
+              <a:t>, </a:t>
+            </a:r>
+            <a:r>
+              <a:rPr lang="ko-KR" altLang="ko-KR" sz="900" dirty="0" err="1">
+                <a:solidFill>
+                  <a:schemeClr val="bg1"/>
+                </a:solidFill>
+                <a:latin typeface="D2Coding" panose="020B0609020101020101" pitchFamily="49" charset="-127"/>
+                <a:ea typeface="D2Coding" panose="020B0609020101020101" pitchFamily="49" charset="-127"/>
+              </a:rPr>
+              <a:t>value</a:t>
+            </a:r>
+            <a:endParaRPr lang="ko-KR" altLang="ko-KR" sz="900" dirty="0">
+              <a:solidFill>
+                <a:schemeClr val="bg1"/>
+              </a:solidFill>
+              <a:latin typeface="Arial" panose="020B0604020202020204" pitchFamily="34" charset="0"/>
+            </a:endParaRPr>
+          </a:p>
+        </p:txBody>
+      </p:sp>
+      <p:sp>
+        <p:nvSpPr>
+          <p:cNvPr id="46" name="직사각형 45"/>
+          <p:cNvSpPr/>
+          <p:nvPr/>
+        </p:nvSpPr>
+        <p:spPr>
+          <a:xfrm>
+            <a:off x="2721427" y="2520008"/>
+            <a:ext cx="5128531" cy="310242"/>
+          </a:xfrm>
+          <a:prstGeom prst="rect">
+            <a:avLst/>
+          </a:prstGeom>
+        </p:spPr>
+        <p:style>
+          <a:lnRef idx="2">
+            <a:schemeClr val="accent6">
+              <a:shade val="50000"/>
+            </a:schemeClr>
+          </a:lnRef>
+          <a:fillRef idx="1">
+            <a:schemeClr val="accent6"/>
+          </a:fillRef>
+          <a:effectRef idx="0">
+            <a:schemeClr val="accent6"/>
+          </a:effectRef>
+          <a:fontRef idx="minor">
+            <a:schemeClr val="lt1"/>
+          </a:fontRef>
+        </p:style>
+        <p:txBody>
+          <a:bodyPr rtlCol="0" anchor="ctr"/>
+          <a:lstStyle/>
+          <a:p>
+            <a:pPr lvl="0" eaLnBrk="0" fontAlgn="base" latinLnBrk="0" hangingPunct="0">
+              <a:spcBef>
+                <a:spcPct val="0"/>
+              </a:spcBef>
+              <a:spcAft>
+                <a:spcPct val="0"/>
+              </a:spcAft>
+            </a:pPr>
+            <a:r>
+              <a:rPr lang="ko-KR" altLang="ko-KR" sz="900" dirty="0" err="1" smtClean="0">
+                <a:solidFill>
+                  <a:schemeClr val="bg1"/>
+                </a:solidFill>
+                <a:latin typeface="D2Coding" panose="020B0609020101020101" pitchFamily="49" charset="-127"/>
+                <a:ea typeface="D2Coding" panose="020B0609020101020101" pitchFamily="49" charset="-127"/>
+              </a:rPr>
+              <a:t>CommRqData</a:t>
+            </a:r>
+            <a:r>
+              <a:rPr lang="ko-KR" altLang="ko-KR" sz="900" dirty="0" smtClean="0">
+                <a:solidFill>
+                  <a:schemeClr val="bg1"/>
+                </a:solidFill>
+                <a:latin typeface="D2Coding" panose="020B0609020101020101" pitchFamily="49" charset="-127"/>
+                <a:ea typeface="D2Coding" panose="020B0609020101020101" pitchFamily="49" charset="-127"/>
+              </a:rPr>
+              <a:t>(</a:t>
+            </a:r>
+            <a:r>
+              <a:rPr lang="ko-KR" altLang="ko-KR" sz="900" dirty="0" err="1" smtClean="0">
+                <a:solidFill>
+                  <a:schemeClr val="bg1"/>
+                </a:solidFill>
+                <a:latin typeface="D2Coding" panose="020B0609020101020101" pitchFamily="49" charset="-127"/>
+                <a:ea typeface="D2Coding" panose="020B0609020101020101" pitchFamily="49" charset="-127"/>
+              </a:rPr>
+              <a:t>QString</a:t>
+            </a:r>
+            <a:r>
+              <a:rPr lang="ko-KR" altLang="ko-KR" sz="900" dirty="0">
+                <a:solidFill>
+                  <a:schemeClr val="bg1"/>
+                </a:solidFill>
+                <a:latin typeface="D2Coding" panose="020B0609020101020101" pitchFamily="49" charset="-127"/>
+                <a:ea typeface="D2Coding" panose="020B0609020101020101" pitchFamily="49" charset="-127"/>
+              </a:rPr>
+              <a:t>, </a:t>
+            </a:r>
+            <a:r>
+              <a:rPr lang="ko-KR" altLang="ko-KR" sz="900" dirty="0" err="1">
+                <a:solidFill>
+                  <a:schemeClr val="bg1"/>
+                </a:solidFill>
+                <a:latin typeface="D2Coding" panose="020B0609020101020101" pitchFamily="49" charset="-127"/>
+                <a:ea typeface="D2Coding" panose="020B0609020101020101" pitchFamily="49" charset="-127"/>
+              </a:rPr>
+              <a:t>QString</a:t>
+            </a:r>
+            <a:r>
+              <a:rPr lang="ko-KR" altLang="ko-KR" sz="900" dirty="0">
+                <a:solidFill>
+                  <a:schemeClr val="bg1"/>
+                </a:solidFill>
+                <a:latin typeface="D2Coding" panose="020B0609020101020101" pitchFamily="49" charset="-127"/>
+                <a:ea typeface="D2Coding" panose="020B0609020101020101" pitchFamily="49" charset="-127"/>
+              </a:rPr>
+              <a:t>, </a:t>
+            </a:r>
+            <a:r>
+              <a:rPr lang="ko-KR" altLang="ko-KR" sz="900" dirty="0" err="1">
+                <a:solidFill>
+                  <a:schemeClr val="bg1"/>
+                </a:solidFill>
+                <a:latin typeface="D2Coding" panose="020B0609020101020101" pitchFamily="49" charset="-127"/>
+                <a:ea typeface="D2Coding" panose="020B0609020101020101" pitchFamily="49" charset="-127"/>
+              </a:rPr>
+              <a:t>int</a:t>
+            </a:r>
+            <a:r>
+              <a:rPr lang="ko-KR" altLang="ko-KR" sz="900" dirty="0">
+                <a:solidFill>
+                  <a:schemeClr val="bg1"/>
+                </a:solidFill>
+                <a:latin typeface="D2Coding" panose="020B0609020101020101" pitchFamily="49" charset="-127"/>
+                <a:ea typeface="D2Coding" panose="020B0609020101020101" pitchFamily="49" charset="-127"/>
+              </a:rPr>
+              <a:t>, </a:t>
+            </a:r>
+            <a:r>
+              <a:rPr lang="ko-KR" altLang="ko-KR" sz="900" dirty="0" err="1">
+                <a:solidFill>
+                  <a:schemeClr val="bg1"/>
+                </a:solidFill>
+                <a:latin typeface="D2Coding" panose="020B0609020101020101" pitchFamily="49" charset="-127"/>
+                <a:ea typeface="D2Coding" panose="020B0609020101020101" pitchFamily="49" charset="-127"/>
+              </a:rPr>
+              <a:t>QString</a:t>
+            </a:r>
+            <a:r>
+              <a:rPr lang="ko-KR" altLang="ko-KR" sz="900" dirty="0">
+                <a:solidFill>
+                  <a:schemeClr val="bg1"/>
+                </a:solidFill>
+                <a:latin typeface="D2Coding" panose="020B0609020101020101" pitchFamily="49" charset="-127"/>
+                <a:ea typeface="D2Coding" panose="020B0609020101020101" pitchFamily="49" charset="-127"/>
+              </a:rPr>
+              <a:t>)", </a:t>
+            </a:r>
+            <a:r>
+              <a:rPr lang="ko-KR" altLang="ko-KR" sz="900" dirty="0" err="1">
+                <a:solidFill>
+                  <a:schemeClr val="bg1"/>
+                </a:solidFill>
+                <a:latin typeface="D2Coding" panose="020B0609020101020101" pitchFamily="49" charset="-127"/>
+                <a:ea typeface="D2Coding" panose="020B0609020101020101" pitchFamily="49" charset="-127"/>
+              </a:rPr>
+              <a:t>rqname</a:t>
+            </a:r>
+            <a:r>
+              <a:rPr lang="ko-KR" altLang="ko-KR" sz="900" dirty="0">
+                <a:solidFill>
+                  <a:schemeClr val="bg1"/>
+                </a:solidFill>
+                <a:latin typeface="D2Coding" panose="020B0609020101020101" pitchFamily="49" charset="-127"/>
+                <a:ea typeface="D2Coding" panose="020B0609020101020101" pitchFamily="49" charset="-127"/>
+              </a:rPr>
+              <a:t>, </a:t>
+            </a:r>
+            <a:r>
+              <a:rPr lang="ko-KR" altLang="ko-KR" sz="900" dirty="0" err="1">
+                <a:solidFill>
+                  <a:schemeClr val="bg1"/>
+                </a:solidFill>
+                <a:latin typeface="D2Coding" panose="020B0609020101020101" pitchFamily="49" charset="-127"/>
+                <a:ea typeface="D2Coding" panose="020B0609020101020101" pitchFamily="49" charset="-127"/>
+              </a:rPr>
+              <a:t>trcode</a:t>
+            </a:r>
+            <a:r>
+              <a:rPr lang="ko-KR" altLang="ko-KR" sz="900" dirty="0">
+                <a:solidFill>
+                  <a:schemeClr val="bg1"/>
+                </a:solidFill>
+                <a:latin typeface="D2Coding" panose="020B0609020101020101" pitchFamily="49" charset="-127"/>
+                <a:ea typeface="D2Coding" panose="020B0609020101020101" pitchFamily="49" charset="-127"/>
+              </a:rPr>
+              <a:t>, </a:t>
+            </a:r>
+            <a:r>
+              <a:rPr lang="ko-KR" altLang="ko-KR" sz="900" dirty="0" err="1">
+                <a:solidFill>
+                  <a:schemeClr val="bg1"/>
+                </a:solidFill>
+                <a:latin typeface="D2Coding" panose="020B0609020101020101" pitchFamily="49" charset="-127"/>
+                <a:ea typeface="D2Coding" panose="020B0609020101020101" pitchFamily="49" charset="-127"/>
+              </a:rPr>
+              <a:t>int</a:t>
+            </a:r>
+            <a:r>
+              <a:rPr lang="ko-KR" altLang="ko-KR" sz="900" dirty="0">
+                <a:solidFill>
+                  <a:schemeClr val="bg1"/>
+                </a:solidFill>
+                <a:latin typeface="D2Coding" panose="020B0609020101020101" pitchFamily="49" charset="-127"/>
+                <a:ea typeface="D2Coding" panose="020B0609020101020101" pitchFamily="49" charset="-127"/>
+              </a:rPr>
+              <a:t>(</a:t>
+            </a:r>
+            <a:r>
+              <a:rPr lang="ko-KR" altLang="ko-KR" sz="900" dirty="0" err="1">
+                <a:solidFill>
+                  <a:schemeClr val="bg1"/>
+                </a:solidFill>
+                <a:latin typeface="D2Coding" panose="020B0609020101020101" pitchFamily="49" charset="-127"/>
+                <a:ea typeface="D2Coding" panose="020B0609020101020101" pitchFamily="49" charset="-127"/>
+              </a:rPr>
+              <a:t>next</a:t>
+            </a:r>
+            <a:r>
+              <a:rPr lang="ko-KR" altLang="ko-KR" sz="900" dirty="0">
+                <a:solidFill>
+                  <a:schemeClr val="bg1"/>
+                </a:solidFill>
+                <a:latin typeface="D2Coding" panose="020B0609020101020101" pitchFamily="49" charset="-127"/>
+                <a:ea typeface="D2Coding" panose="020B0609020101020101" pitchFamily="49" charset="-127"/>
+              </a:rPr>
+              <a:t>), </a:t>
+            </a:r>
+            <a:r>
+              <a:rPr lang="ko-KR" altLang="ko-KR" sz="900" dirty="0" err="1" smtClean="0">
+                <a:solidFill>
+                  <a:schemeClr val="bg1"/>
+                </a:solidFill>
+                <a:latin typeface="D2Coding" panose="020B0609020101020101" pitchFamily="49" charset="-127"/>
+                <a:ea typeface="D2Coding" panose="020B0609020101020101" pitchFamily="49" charset="-127"/>
+              </a:rPr>
+              <a:t>screen_no</a:t>
+            </a:r>
+            <a:endParaRPr lang="ko-KR" altLang="ko-KR" dirty="0">
+              <a:solidFill>
+                <a:schemeClr val="bg1"/>
+              </a:solidFill>
+              <a:latin typeface="Arial" panose="020B0604020202020204" pitchFamily="34" charset="0"/>
+            </a:endParaRPr>
+          </a:p>
+        </p:txBody>
+      </p:sp>
+      <p:sp>
+        <p:nvSpPr>
+          <p:cNvPr id="13" name="모서리가 둥근 직사각형 12"/>
+          <p:cNvSpPr/>
+          <p:nvPr/>
+        </p:nvSpPr>
+        <p:spPr>
+          <a:xfrm>
+            <a:off x="7707366" y="2638425"/>
+            <a:ext cx="1093734" cy="191825"/>
+          </a:xfrm>
+          <a:prstGeom prst="roundRect">
+            <a:avLst/>
+          </a:prstGeom>
+        </p:spPr>
+        <p:style>
+          <a:lnRef idx="2">
+            <a:schemeClr val="accent2">
+              <a:shade val="50000"/>
+            </a:schemeClr>
+          </a:lnRef>
+          <a:fillRef idx="1">
+            <a:schemeClr val="accent2"/>
+          </a:fillRef>
+          <a:effectRef idx="0">
+            <a:schemeClr val="accent2"/>
+          </a:effectRef>
+          <a:fontRef idx="minor">
+            <a:schemeClr val="lt1"/>
+          </a:fontRef>
+        </p:style>
+        <p:txBody>
+          <a:bodyPr rtlCol="0" anchor="ctr"/>
+          <a:lstStyle/>
+          <a:p>
+            <a:pPr algn="ctr"/>
+            <a:r>
+              <a:rPr lang="en-US" altLang="ko-KR" sz="1100" dirty="0" smtClean="0"/>
+              <a:t>TR </a:t>
+            </a:r>
+            <a:r>
+              <a:rPr lang="ko-KR" altLang="en-US" sz="1100" dirty="0" smtClean="0"/>
+              <a:t>수신 대기</a:t>
+            </a:r>
+            <a:endParaRPr lang="ko-KR" altLang="en-US" sz="1100" dirty="0"/>
+          </a:p>
+        </p:txBody>
+      </p:sp>
+      <p:sp>
+        <p:nvSpPr>
+          <p:cNvPr id="51" name="모서리가 둥근 직사각형 50"/>
+          <p:cNvSpPr/>
+          <p:nvPr/>
+        </p:nvSpPr>
+        <p:spPr>
+          <a:xfrm>
+            <a:off x="3819829" y="4083162"/>
+            <a:ext cx="1656743" cy="213557"/>
+          </a:xfrm>
+          <a:prstGeom prst="roundRect">
+            <a:avLst/>
+          </a:prstGeom>
+        </p:spPr>
+        <p:style>
+          <a:lnRef idx="2">
+            <a:schemeClr val="accent2">
+              <a:shade val="50000"/>
+            </a:schemeClr>
+          </a:lnRef>
+          <a:fillRef idx="1">
+            <a:schemeClr val="accent2"/>
+          </a:fillRef>
+          <a:effectRef idx="0">
+            <a:schemeClr val="accent2"/>
+          </a:effectRef>
+          <a:fontRef idx="minor">
+            <a:schemeClr val="lt1"/>
+          </a:fontRef>
+        </p:style>
+        <p:txBody>
+          <a:bodyPr rtlCol="0" anchor="ctr"/>
+          <a:lstStyle/>
+          <a:p>
+            <a:pPr lvl="0" algn="ctr" fontAlgn="base">
+              <a:spcBef>
+                <a:spcPct val="0"/>
+              </a:spcBef>
+              <a:spcAft>
+                <a:spcPct val="0"/>
+              </a:spcAft>
+            </a:pPr>
+            <a:r>
+              <a:rPr lang="ko-KR" altLang="ko-KR" sz="1100" dirty="0" err="1"/>
+              <a:t>OnReceiveTrData</a:t>
+            </a:r>
+            <a:r>
+              <a:rPr lang="en-US" altLang="ko-KR" sz="1100" dirty="0"/>
+              <a:t> </a:t>
+            </a:r>
+            <a:r>
+              <a:rPr lang="ko-KR" altLang="en-US" sz="1100" dirty="0"/>
+              <a:t>수신</a:t>
+            </a:r>
+            <a:endParaRPr lang="ko-KR" altLang="ko-KR" sz="1100" dirty="0"/>
+          </a:p>
+        </p:txBody>
+      </p:sp>
+      <p:cxnSp>
+        <p:nvCxnSpPr>
+          <p:cNvPr id="68" name="직선 화살표 연결선 67"/>
+          <p:cNvCxnSpPr/>
+          <p:nvPr/>
+        </p:nvCxnSpPr>
+        <p:spPr>
+          <a:xfrm flipH="1" flipV="1">
+            <a:off x="1252005" y="1048164"/>
+            <a:ext cx="1277564" cy="1938730"/>
+          </a:xfrm>
+          <a:prstGeom prst="straightConnector1">
+            <a:avLst/>
+          </a:prstGeom>
+          <a:ln w="25400">
+            <a:solidFill>
+              <a:schemeClr val="tx1"/>
+            </a:solidFill>
+            <a:headEnd w="lg" len="lg"/>
+            <a:tailEnd type="stealth"/>
+          </a:ln>
+        </p:spPr>
+        <p:style>
+          <a:lnRef idx="1">
+            <a:schemeClr val="accent1"/>
+          </a:lnRef>
+          <a:fillRef idx="0">
+            <a:schemeClr val="accent1"/>
+          </a:fillRef>
+          <a:effectRef idx="0">
+            <a:schemeClr val="accent1"/>
+          </a:effectRef>
+          <a:fontRef idx="minor">
+            <a:schemeClr val="tx1"/>
+          </a:fontRef>
+        </p:style>
+      </p:cxnSp>
+      <p:cxnSp>
+        <p:nvCxnSpPr>
+          <p:cNvPr id="36" name="꺾인 연결선 35"/>
+          <p:cNvCxnSpPr>
+            <a:stCxn id="13" idx="2"/>
+            <a:endCxn id="51" idx="0"/>
+          </p:cNvCxnSpPr>
+          <p:nvPr/>
+        </p:nvCxnSpPr>
+        <p:spPr>
+          <a:xfrm rot="5400000">
+            <a:off x="5824761" y="1653690"/>
+            <a:ext cx="1252912" cy="3606032"/>
+          </a:xfrm>
+          <a:prstGeom prst="bentConnector3">
+            <a:avLst/>
+          </a:prstGeom>
+          <a:ln w="25400">
+            <a:solidFill>
+              <a:schemeClr val="tx1"/>
+            </a:solidFill>
+            <a:headEnd w="lg" len="lg"/>
+            <a:tailEnd type="stealth"/>
+          </a:ln>
+        </p:spPr>
+        <p:style>
+          <a:lnRef idx="1">
+            <a:schemeClr val="accent1"/>
+          </a:lnRef>
+          <a:fillRef idx="0">
+            <a:schemeClr val="accent1"/>
+          </a:fillRef>
+          <a:effectRef idx="0">
+            <a:schemeClr val="accent1"/>
+          </a:effectRef>
+          <a:fontRef idx="minor">
+            <a:schemeClr val="tx1"/>
+          </a:fontRef>
+        </p:style>
+      </p:cxnSp>
+      <p:sp>
+        <p:nvSpPr>
+          <p:cNvPr id="38" name="TextBox 37"/>
+          <p:cNvSpPr txBox="1"/>
+          <p:nvPr/>
+        </p:nvSpPr>
+        <p:spPr>
+          <a:xfrm>
+            <a:off x="7086600" y="4354894"/>
+            <a:ext cx="3199915" cy="369332"/>
+          </a:xfrm>
+          <a:prstGeom prst="rect">
+            <a:avLst/>
+          </a:prstGeom>
+          <a:noFill/>
+        </p:spPr>
+        <p:txBody>
+          <a:bodyPr wrap="none" rtlCol="0">
+            <a:spAutoFit/>
+          </a:bodyPr>
+          <a:lstStyle/>
+          <a:p>
+            <a:r>
+              <a:rPr lang="ko-KR" altLang="en-US" smtClean="0"/>
+              <a:t>사용자 요청 데이터를 </a:t>
+            </a:r>
+            <a:r>
+              <a:rPr lang="ko-KR" altLang="en-US" dirty="0" err="1" smtClean="0"/>
+              <a:t>받아옴</a:t>
+            </a:r>
+            <a:endParaRPr lang="ko-KR" altLang="en-US" dirty="0"/>
+          </a:p>
+        </p:txBody>
+      </p:sp>
+    </p:spTree>
+    <p:extLst>
+      <p:ext uri="{BB962C8B-B14F-4D97-AF65-F5344CB8AC3E}">
+        <p14:creationId xmlns:p14="http://schemas.microsoft.com/office/powerpoint/2010/main" val="2966190672"/>
       </p:ext>
     </p:extLst>
   </p:cSld>

</xml_diff>